<commit_message>
WORKING FIFTH ROUND MATCH PROGRAM
</commit_message>
<xml_diff>
--- a/Presentation_Matching_2.pptx
+++ b/Presentation_Matching_2.pptx
@@ -5,7 +5,7 @@
     <p:sldMasterId id="2147483660" r:id="rId4"/>
   </p:sldMasterIdLst>
   <p:notesMasterIdLst>
-    <p:notesMasterId r:id="rId17"/>
+    <p:notesMasterId r:id="rId18"/>
   </p:notesMasterIdLst>
   <p:sldIdLst>
     <p:sldId id="256" r:id="rId5"/>
@@ -17,9 +17,10 @@
     <p:sldId id="290" r:id="rId11"/>
     <p:sldId id="291" r:id="rId12"/>
     <p:sldId id="292" r:id="rId13"/>
-    <p:sldId id="293" r:id="rId14"/>
-    <p:sldId id="294" r:id="rId15"/>
-    <p:sldId id="272" r:id="rId16"/>
+    <p:sldId id="295" r:id="rId14"/>
+    <p:sldId id="293" r:id="rId15"/>
+    <p:sldId id="294" r:id="rId16"/>
+    <p:sldId id="272" r:id="rId17"/>
   </p:sldIdLst>
   <p:sldSz cx="12192000" cy="6858000"/>
   <p:notesSz cx="6858000" cy="9144000"/>
@@ -208,7 +209,7 @@
           <a:p>
             <a:fld id="{D9492CFB-E4E2-4671-84C9-9231D204B1B9}" type="datetimeFigureOut">
               <a:rPr lang="en-US" smtClean="0"/>
-              <a:t>7/31/2024</a:t>
+              <a:t>8/8/2024</a:t>
             </a:fld>
             <a:endParaRPr lang="en-US"/>
           </a:p>
@@ -1138,7 +1139,7 @@
     </p:spTree>
     <p:extLst>
       <p:ext uri="{BB962C8B-B14F-4D97-AF65-F5344CB8AC3E}">
-        <p14:creationId xmlns:p14="http://schemas.microsoft.com/office/powerpoint/2010/main" val="3311370257"/>
+        <p14:creationId xmlns:p14="http://schemas.microsoft.com/office/powerpoint/2010/main" val="3985976894"/>
       </p:ext>
     </p:extLst>
   </p:cSld>
@@ -1214,6 +1215,90 @@
             <a:fld id="{D62F91BE-0B5C-4DB9-8EF4-A5A81C125A9B}" type="slidenum">
               <a:rPr lang="en-US" smtClean="0"/>
               <a:t>11</a:t>
+            </a:fld>
+            <a:endParaRPr lang="en-US"/>
+          </a:p>
+        </p:txBody>
+      </p:sp>
+    </p:spTree>
+    <p:extLst>
+      <p:ext uri="{BB962C8B-B14F-4D97-AF65-F5344CB8AC3E}">
+        <p14:creationId xmlns:p14="http://schemas.microsoft.com/office/powerpoint/2010/main" val="3311370257"/>
+      </p:ext>
+    </p:extLst>
+  </p:cSld>
+  <p:clrMapOvr>
+    <a:masterClrMapping/>
+  </p:clrMapOvr>
+</p:notes>
+</file>
+
+<file path=ppt/notesSlides/notesSlide9.xml><?xml version="1.0" encoding="utf-8"?>
+<p:notes xmlns:a="http://schemas.openxmlformats.org/drawingml/2006/main" xmlns:r="http://schemas.openxmlformats.org/officeDocument/2006/relationships" xmlns:p="http://schemas.openxmlformats.org/presentationml/2006/main">
+  <p:cSld>
+    <p:spTree>
+      <p:nvGrpSpPr>
+        <p:cNvPr id="1" name=""/>
+        <p:cNvGrpSpPr/>
+        <p:nvPr/>
+      </p:nvGrpSpPr>
+      <p:grpSpPr>
+        <a:xfrm>
+          <a:off x="0" y="0"/>
+          <a:ext cx="0" cy="0"/>
+          <a:chOff x="0" y="0"/>
+          <a:chExt cx="0" cy="0"/>
+        </a:xfrm>
+      </p:grpSpPr>
+      <p:sp>
+        <p:nvSpPr>
+          <p:cNvPr id="2" name="Slide Image Placeholder 1"/>
+          <p:cNvSpPr>
+            <a:spLocks noGrp="1" noRot="1" noChangeAspect="1"/>
+          </p:cNvSpPr>
+          <p:nvPr>
+            <p:ph type="sldImg"/>
+          </p:nvPr>
+        </p:nvSpPr>
+        <p:spPr/>
+      </p:sp>
+      <p:sp>
+        <p:nvSpPr>
+          <p:cNvPr id="3" name="Notes Placeholder 2"/>
+          <p:cNvSpPr>
+            <a:spLocks noGrp="1"/>
+          </p:cNvSpPr>
+          <p:nvPr>
+            <p:ph type="body" idx="1"/>
+          </p:nvPr>
+        </p:nvSpPr>
+        <p:spPr/>
+        <p:txBody>
+          <a:bodyPr/>
+          <a:lstStyle/>
+          <a:p>
+            <a:endParaRPr lang="en-US" dirty="0"/>
+          </a:p>
+        </p:txBody>
+      </p:sp>
+      <p:sp>
+        <p:nvSpPr>
+          <p:cNvPr id="4" name="Slide Number Placeholder 3"/>
+          <p:cNvSpPr>
+            <a:spLocks noGrp="1"/>
+          </p:cNvSpPr>
+          <p:nvPr>
+            <p:ph type="sldNum" sz="quarter" idx="5"/>
+          </p:nvPr>
+        </p:nvSpPr>
+        <p:spPr/>
+        <p:txBody>
+          <a:bodyPr/>
+          <a:lstStyle/>
+          <a:p>
+            <a:fld id="{D62F91BE-0B5C-4DB9-8EF4-A5A81C125A9B}" type="slidenum">
+              <a:rPr lang="en-US" smtClean="0"/>
+              <a:t>12</a:t>
             </a:fld>
             <a:endParaRPr lang="en-US"/>
           </a:p>
@@ -1361,7 +1446,7 @@
           <a:p>
             <a:fld id="{846CE7D5-CF57-46EF-B807-FDD0502418D4}" type="datetimeFigureOut">
               <a:rPr lang="en-US" smtClean="0"/>
-              <a:t>7/31/2024</a:t>
+              <a:t>8/8/2024</a:t>
             </a:fld>
             <a:endParaRPr lang="en-US"/>
           </a:p>
@@ -1529,7 +1614,7 @@
           <a:p>
             <a:fld id="{846CE7D5-CF57-46EF-B807-FDD0502418D4}" type="datetimeFigureOut">
               <a:rPr lang="en-US" smtClean="0"/>
-              <a:t>7/31/2024</a:t>
+              <a:t>8/8/2024</a:t>
             </a:fld>
             <a:endParaRPr lang="en-US"/>
           </a:p>
@@ -1707,7 +1792,7 @@
           <a:p>
             <a:fld id="{846CE7D5-CF57-46EF-B807-FDD0502418D4}" type="datetimeFigureOut">
               <a:rPr lang="en-US" smtClean="0"/>
-              <a:t>7/31/2024</a:t>
+              <a:t>8/8/2024</a:t>
             </a:fld>
             <a:endParaRPr lang="en-US"/>
           </a:p>
@@ -1875,7 +1960,7 @@
           <a:p>
             <a:fld id="{846CE7D5-CF57-46EF-B807-FDD0502418D4}" type="datetimeFigureOut">
               <a:rPr lang="en-US" smtClean="0"/>
-              <a:t>7/31/2024</a:t>
+              <a:t>8/8/2024</a:t>
             </a:fld>
             <a:endParaRPr lang="en-US"/>
           </a:p>
@@ -2120,7 +2205,7 @@
           <a:p>
             <a:fld id="{846CE7D5-CF57-46EF-B807-FDD0502418D4}" type="datetimeFigureOut">
               <a:rPr lang="en-US" smtClean="0"/>
-              <a:t>7/31/2024</a:t>
+              <a:t>8/8/2024</a:t>
             </a:fld>
             <a:endParaRPr lang="en-US"/>
           </a:p>
@@ -2349,7 +2434,7 @@
           <a:p>
             <a:fld id="{846CE7D5-CF57-46EF-B807-FDD0502418D4}" type="datetimeFigureOut">
               <a:rPr lang="en-US" smtClean="0"/>
-              <a:t>7/31/2024</a:t>
+              <a:t>8/8/2024</a:t>
             </a:fld>
             <a:endParaRPr lang="en-US"/>
           </a:p>
@@ -2713,7 +2798,7 @@
           <a:p>
             <a:fld id="{846CE7D5-CF57-46EF-B807-FDD0502418D4}" type="datetimeFigureOut">
               <a:rPr lang="en-US" smtClean="0"/>
-              <a:t>7/31/2024</a:t>
+              <a:t>8/8/2024</a:t>
             </a:fld>
             <a:endParaRPr lang="en-US"/>
           </a:p>
@@ -2830,7 +2915,7 @@
           <a:p>
             <a:fld id="{846CE7D5-CF57-46EF-B807-FDD0502418D4}" type="datetimeFigureOut">
               <a:rPr lang="en-US" smtClean="0"/>
-              <a:t>7/31/2024</a:t>
+              <a:t>8/8/2024</a:t>
             </a:fld>
             <a:endParaRPr lang="en-US"/>
           </a:p>
@@ -2925,7 +3010,7 @@
           <a:p>
             <a:fld id="{846CE7D5-CF57-46EF-B807-FDD0502418D4}" type="datetimeFigureOut">
               <a:rPr lang="en-US" smtClean="0"/>
-              <a:t>7/31/2024</a:t>
+              <a:t>8/8/2024</a:t>
             </a:fld>
             <a:endParaRPr lang="en-US"/>
           </a:p>
@@ -3200,7 +3285,7 @@
           <a:p>
             <a:fld id="{846CE7D5-CF57-46EF-B807-FDD0502418D4}" type="datetimeFigureOut">
               <a:rPr lang="en-US" smtClean="0"/>
-              <a:t>7/31/2024</a:t>
+              <a:t>8/8/2024</a:t>
             </a:fld>
             <a:endParaRPr lang="en-US"/>
           </a:p>
@@ -3455,7 +3540,7 @@
           <a:p>
             <a:fld id="{846CE7D5-CF57-46EF-B807-FDD0502418D4}" type="datetimeFigureOut">
               <a:rPr lang="en-US" smtClean="0"/>
-              <a:t>7/31/2024</a:t>
+              <a:t>8/8/2024</a:t>
             </a:fld>
             <a:endParaRPr lang="en-US"/>
           </a:p>
@@ -3681,7 +3766,7 @@
           <a:p>
             <a:fld id="{846CE7D5-CF57-46EF-B807-FDD0502418D4}" type="datetimeFigureOut">
               <a:rPr lang="en-US" smtClean="0"/>
-              <a:t>7/31/2024</a:t>
+              <a:t>8/8/2024</a:t>
             </a:fld>
             <a:endParaRPr lang="en-US"/>
           </a:p>
@@ -4695,7 +4780,7 @@
               <a:rPr lang="en-US" b="1" dirty="0">
                 <a:cs typeface="Arial" panose="020B0604020202020204" pitchFamily="34" charset="0"/>
               </a:rPr>
-              <a:t>Summary </a:t>
+              <a:t>Fifth Round Match </a:t>
             </a:r>
           </a:p>
         </p:txBody>
@@ -4800,8 +4885,8 @@
         </p:nvSpPr>
         <p:spPr>
           <a:xfrm>
-            <a:off x="1494031" y="1488142"/>
-            <a:ext cx="10287000" cy="1138773"/>
+            <a:off x="1494031" y="1270162"/>
+            <a:ext cx="10287000" cy="2123658"/>
           </a:xfrm>
           <a:prstGeom prst="rect">
             <a:avLst/>
@@ -4821,24 +4906,7 @@
                 </a:solidFill>
                 <a:effectLst/>
               </a:rPr>
-              <a:t>Total Matching = ~ </a:t>
-            </a:r>
-            <a:r>
-              <a:rPr lang="en-US" sz="3200" dirty="0">
-                <a:solidFill>
-                  <a:srgbClr val="000000"/>
-                </a:solidFill>
-              </a:rPr>
-              <a:t>89</a:t>
-            </a:r>
-            <a:r>
-              <a:rPr lang="en-US" sz="3200" b="0" i="0" dirty="0">
-                <a:solidFill>
-                  <a:srgbClr val="000000"/>
-                </a:solidFill>
-                <a:effectLst/>
-              </a:rPr>
-              <a:t>%</a:t>
+              <a:t>Use DP to calculate if it’s possible to sum up to cumulative value, then append possible combination to matching list</a:t>
             </a:r>
             <a:endParaRPr lang="en-US" sz="3200" dirty="0"/>
           </a:p>
@@ -4898,7 +4966,7 @@
         <p:spPr>
           <a:xfrm>
             <a:off x="1494031" y="3188846"/>
-            <a:ext cx="10287000" cy="1631216"/>
+            <a:ext cx="10287000" cy="1138773"/>
           </a:xfrm>
           <a:prstGeom prst="rect">
             <a:avLst/>
@@ -4913,90 +4981,33 @@
           <a:p>
             <a:r>
               <a:rPr lang="en-US" sz="3200" dirty="0"/>
-              <a:t>Most common issues: mismatching price, mismatching quantity </a:t>
-            </a:r>
+              <a:t>Fourth round match percentage = 50% for </a:t>
+            </a:r>
+            <a:r>
+              <a:rPr lang="en-US" sz="3200" dirty="0" err="1"/>
+              <a:t>wb</a:t>
+            </a:r>
+            <a:r>
+              <a:rPr lang="en-US" sz="3200" dirty="0"/>
+              <a:t>, 25% for </a:t>
+            </a:r>
+            <a:r>
+              <a:rPr lang="en-US" sz="3200" dirty="0" err="1"/>
+              <a:t>trf</a:t>
+            </a:r>
+            <a:endParaRPr lang="en-US" sz="3200" dirty="0"/>
           </a:p>
           <a:p>
             <a:endParaRPr lang="en-US" sz="3600" dirty="0"/>
-          </a:p>
-        </p:txBody>
-      </p:sp>
-      <p:sp>
-        <p:nvSpPr>
-          <p:cNvPr id="3" name="TextBox 2">
-            <a:extLst>
-              <a:ext uri="{FF2B5EF4-FFF2-40B4-BE49-F238E27FC236}">
-                <a16:creationId xmlns:a16="http://schemas.microsoft.com/office/drawing/2014/main" id="{44AC52A0-3BF9-A9A3-DC6F-4935533AC599}"/>
-              </a:ext>
-            </a:extLst>
-          </p:cNvPr>
-          <p:cNvSpPr txBox="1"/>
-          <p:nvPr/>
-        </p:nvSpPr>
-        <p:spPr>
-          <a:xfrm>
-            <a:off x="2965307" y="4512285"/>
-            <a:ext cx="738909" cy="307777"/>
-          </a:xfrm>
-          <a:prstGeom prst="rect">
-            <a:avLst/>
-          </a:prstGeom>
-          <a:noFill/>
-        </p:spPr>
-        <p:txBody>
-          <a:bodyPr wrap="square" rtlCol="0">
-            <a:spAutoFit/>
-          </a:bodyPr>
-          <a:lstStyle/>
-          <a:p>
-            <a:r>
-              <a:rPr lang="en-US" sz="1400" dirty="0"/>
-              <a:t>TRF</a:t>
-            </a:r>
-          </a:p>
-        </p:txBody>
-      </p:sp>
-      <p:sp>
-        <p:nvSpPr>
-          <p:cNvPr id="4" name="TextBox 3">
-            <a:extLst>
-              <a:ext uri="{FF2B5EF4-FFF2-40B4-BE49-F238E27FC236}">
-                <a16:creationId xmlns:a16="http://schemas.microsoft.com/office/drawing/2014/main" id="{89FEC1A5-AB29-239B-DB62-97DFADDD90AE}"/>
-              </a:ext>
-            </a:extLst>
-          </p:cNvPr>
-          <p:cNvSpPr txBox="1"/>
-          <p:nvPr/>
-        </p:nvSpPr>
-        <p:spPr>
-          <a:xfrm>
-            <a:off x="8558556" y="4512285"/>
-            <a:ext cx="738909" cy="307777"/>
-          </a:xfrm>
-          <a:prstGeom prst="rect">
-            <a:avLst/>
-          </a:prstGeom>
-          <a:noFill/>
-        </p:spPr>
-        <p:txBody>
-          <a:bodyPr wrap="square" rtlCol="0">
-            <a:spAutoFit/>
-          </a:bodyPr>
-          <a:lstStyle/>
-          <a:p>
-            <a:r>
-              <a:rPr lang="en-US" sz="1400" dirty="0"/>
-              <a:t>WB</a:t>
-            </a:r>
           </a:p>
         </p:txBody>
       </p:sp>
       <p:pic>
         <p:nvPicPr>
-          <p:cNvPr id="10" name="Picture 9">
-            <a:extLst>
-              <a:ext uri="{FF2B5EF4-FFF2-40B4-BE49-F238E27FC236}">
-                <a16:creationId xmlns:a16="http://schemas.microsoft.com/office/drawing/2014/main" id="{1E72E8A1-7817-BFAE-0A9F-FFEA1F987E1E}"/>
+          <p:cNvPr id="14" name="Graphic 13" descr="Badge 3 with solid fill">
+            <a:extLst>
+              <a:ext uri="{FF2B5EF4-FFF2-40B4-BE49-F238E27FC236}">
+                <a16:creationId xmlns:a16="http://schemas.microsoft.com/office/drawing/2014/main" id="{AA8F4E38-A67F-5329-FCDD-927C67F47C4B}"/>
               </a:ext>
             </a:extLst>
           </p:cNvPr>
@@ -5008,8 +5019,8 @@
         <p:blipFill>
           <a:blip r:embed="rId8">
             <a:extLst>
-              <a:ext uri="{28A0092B-C50C-407E-A947-70E740481C1C}">
-                <a14:useLocalDpi xmlns:a14="http://schemas.microsoft.com/office/drawing/2010/main" val="0"/>
+              <a:ext uri="{96DAC541-7B7A-43D3-8B79-37D633B846F1}">
+                <asvg:svgBlip xmlns:asvg="http://schemas.microsoft.com/office/drawing/2016/SVG/main" r:embed="rId9"/>
               </a:ext>
             </a:extLst>
           </a:blip>
@@ -5019,20 +5030,128 @@
         </p:blipFill>
         <p:spPr>
           <a:xfrm>
-            <a:off x="1241660" y="4967829"/>
-            <a:ext cx="4925112" cy="438211"/>
+            <a:off x="410969" y="4718473"/>
+            <a:ext cx="914400" cy="914400"/>
           </a:xfrm>
           <a:prstGeom prst="rect">
             <a:avLst/>
           </a:prstGeom>
         </p:spPr>
       </p:pic>
+      <p:sp>
+        <p:nvSpPr>
+          <p:cNvPr id="15" name="TextBox 14">
+            <a:extLst>
+              <a:ext uri="{FF2B5EF4-FFF2-40B4-BE49-F238E27FC236}">
+                <a16:creationId xmlns:a16="http://schemas.microsoft.com/office/drawing/2014/main" id="{F897CE10-A84B-0423-FF50-F20400A6CCBF}"/>
+              </a:ext>
+            </a:extLst>
+          </p:cNvPr>
+          <p:cNvSpPr txBox="1"/>
+          <p:nvPr/>
+        </p:nvSpPr>
+        <p:spPr>
+          <a:xfrm>
+            <a:off x="1494031" y="4718473"/>
+            <a:ext cx="10287000" cy="1631216"/>
+          </a:xfrm>
+          <a:prstGeom prst="rect">
+            <a:avLst/>
+          </a:prstGeom>
+          <a:noFill/>
+        </p:spPr>
+        <p:txBody>
+          <a:bodyPr wrap="square" lIns="91440" tIns="45720" rIns="91440" bIns="45720" rtlCol="0" anchor="t">
+            <a:spAutoFit/>
+          </a:bodyPr>
+          <a:lstStyle/>
+          <a:p>
+            <a:r>
+              <a:rPr lang="en-US" sz="3200" dirty="0"/>
+              <a:t>Outputs csv files – wb_matching_v5, trf_matching_v5, wb_not_matching_v5, trf_not_matching_v5</a:t>
+            </a:r>
+          </a:p>
+          <a:p>
+            <a:endParaRPr lang="en-US" sz="3600" dirty="0"/>
+          </a:p>
+        </p:txBody>
+      </p:sp>
+      <p:sp>
+        <p:nvSpPr>
+          <p:cNvPr id="3" name="TextBox 2">
+            <a:extLst>
+              <a:ext uri="{FF2B5EF4-FFF2-40B4-BE49-F238E27FC236}">
+                <a16:creationId xmlns:a16="http://schemas.microsoft.com/office/drawing/2014/main" id="{44AC52A0-3BF9-A9A3-DC6F-4935533AC599}"/>
+              </a:ext>
+            </a:extLst>
+          </p:cNvPr>
+          <p:cNvSpPr txBox="1"/>
+          <p:nvPr/>
+        </p:nvSpPr>
+        <p:spPr>
+          <a:xfrm>
+            <a:off x="2485016" y="5803024"/>
+            <a:ext cx="738909" cy="307777"/>
+          </a:xfrm>
+          <a:prstGeom prst="rect">
+            <a:avLst/>
+          </a:prstGeom>
+          <a:noFill/>
+        </p:spPr>
+        <p:txBody>
+          <a:bodyPr wrap="square" rtlCol="0">
+            <a:spAutoFit/>
+          </a:bodyPr>
+          <a:lstStyle/>
+          <a:p>
+            <a:r>
+              <a:rPr lang="en-US" sz="1400" dirty="0"/>
+              <a:t>TRF</a:t>
+            </a:r>
+          </a:p>
+        </p:txBody>
+      </p:sp>
+      <p:sp>
+        <p:nvSpPr>
+          <p:cNvPr id="4" name="TextBox 3">
+            <a:extLst>
+              <a:ext uri="{FF2B5EF4-FFF2-40B4-BE49-F238E27FC236}">
+                <a16:creationId xmlns:a16="http://schemas.microsoft.com/office/drawing/2014/main" id="{89FEC1A5-AB29-239B-DB62-97DFADDD90AE}"/>
+              </a:ext>
+            </a:extLst>
+          </p:cNvPr>
+          <p:cNvSpPr txBox="1"/>
+          <p:nvPr/>
+        </p:nvSpPr>
+        <p:spPr>
+          <a:xfrm>
+            <a:off x="8598622" y="5803023"/>
+            <a:ext cx="738909" cy="307777"/>
+          </a:xfrm>
+          <a:prstGeom prst="rect">
+            <a:avLst/>
+          </a:prstGeom>
+          <a:noFill/>
+        </p:spPr>
+        <p:txBody>
+          <a:bodyPr wrap="square" rtlCol="0">
+            <a:spAutoFit/>
+          </a:bodyPr>
+          <a:lstStyle/>
+          <a:p>
+            <a:r>
+              <a:rPr lang="en-US" sz="1400" dirty="0"/>
+              <a:t>WB</a:t>
+            </a:r>
+          </a:p>
+        </p:txBody>
+      </p:sp>
       <p:pic>
         <p:nvPicPr>
-          <p:cNvPr id="13" name="Picture 12">
-            <a:extLst>
-              <a:ext uri="{FF2B5EF4-FFF2-40B4-BE49-F238E27FC236}">
-                <a16:creationId xmlns:a16="http://schemas.microsoft.com/office/drawing/2014/main" id="{7CFC2FCB-BE84-A0CC-0067-D1E2A7BC5AFE}"/>
+          <p:cNvPr id="12" name="Picture 11" descr="A grid of numbers with black numbers&#10;&#10;Description automatically generated with medium confidence">
+            <a:extLst>
+              <a:ext uri="{FF2B5EF4-FFF2-40B4-BE49-F238E27FC236}">
+                <a16:creationId xmlns:a16="http://schemas.microsoft.com/office/drawing/2014/main" id="{F499EF57-4B73-0C89-EC69-AC74FC2045A4}"/>
               </a:ext>
             </a:extLst>
           </p:cNvPr>
@@ -5042,7 +5161,7 @@
           <p:nvPr/>
         </p:nvPicPr>
         <p:blipFill>
-          <a:blip r:embed="rId9">
+          <a:blip r:embed="rId10">
             <a:extLst>
               <a:ext uri="{28A0092B-C50C-407E-A947-70E740481C1C}">
                 <a14:useLocalDpi xmlns:a14="http://schemas.microsoft.com/office/drawing/2010/main" val="0"/>
@@ -5055,8 +5174,8 @@
         </p:blipFill>
         <p:spPr>
           <a:xfrm>
-            <a:off x="6784586" y="4996408"/>
-            <a:ext cx="4286848" cy="409632"/>
+            <a:off x="670353" y="6158522"/>
+            <a:ext cx="4896533" cy="638264"/>
           </a:xfrm>
           <a:prstGeom prst="rect">
             <a:avLst/>
@@ -5065,10 +5184,10 @@
       </p:pic>
       <p:pic>
         <p:nvPicPr>
-          <p:cNvPr id="18" name="Picture 17">
-            <a:extLst>
-              <a:ext uri="{FF2B5EF4-FFF2-40B4-BE49-F238E27FC236}">
-                <a16:creationId xmlns:a16="http://schemas.microsoft.com/office/drawing/2014/main" id="{625DF1C7-31C2-BFF0-643C-CD111E12C757}"/>
+          <p:cNvPr id="16" name="Picture 15">
+            <a:extLst>
+              <a:ext uri="{FF2B5EF4-FFF2-40B4-BE49-F238E27FC236}">
+                <a16:creationId xmlns:a16="http://schemas.microsoft.com/office/drawing/2014/main" id="{8CBD449B-140B-55CC-7A45-76B78ED8B9D3}"/>
               </a:ext>
             </a:extLst>
           </p:cNvPr>
@@ -5078,7 +5197,7 @@
           <p:nvPr/>
         </p:nvPicPr>
         <p:blipFill>
-          <a:blip r:embed="rId10">
+          <a:blip r:embed="rId11">
             <a:extLst>
               <a:ext uri="{28A0092B-C50C-407E-A947-70E740481C1C}">
                 <a14:useLocalDpi xmlns:a14="http://schemas.microsoft.com/office/drawing/2010/main" val="0"/>
@@ -5091,136 +5210,31 @@
         </p:blipFill>
         <p:spPr>
           <a:xfrm>
-            <a:off x="1232133" y="5800576"/>
-            <a:ext cx="4934639" cy="228632"/>
+            <a:off x="6810362" y="6259284"/>
+            <a:ext cx="4315427" cy="419158"/>
           </a:xfrm>
           <a:prstGeom prst="rect">
             <a:avLst/>
           </a:prstGeom>
         </p:spPr>
       </p:pic>
-      <p:pic>
-        <p:nvPicPr>
-          <p:cNvPr id="20" name="Picture 19">
-            <a:extLst>
-              <a:ext uri="{FF2B5EF4-FFF2-40B4-BE49-F238E27FC236}">
-                <a16:creationId xmlns:a16="http://schemas.microsoft.com/office/drawing/2014/main" id="{BDF0F840-3238-ED09-8D2B-F0105DFE85EA}"/>
-              </a:ext>
-            </a:extLst>
-          </p:cNvPr>
-          <p:cNvPicPr>
-            <a:picLocks noChangeAspect="1"/>
-          </p:cNvPicPr>
-          <p:nvPr/>
-        </p:nvPicPr>
-        <p:blipFill rotWithShape="1">
-          <a:blip r:embed="rId11">
-            <a:extLst>
-              <a:ext uri="{28A0092B-C50C-407E-A947-70E740481C1C}">
-                <a14:useLocalDpi xmlns:a14="http://schemas.microsoft.com/office/drawing/2010/main" val="0"/>
-              </a:ext>
-            </a:extLst>
-          </a:blip>
-          <a:srcRect r="13294"/>
-          <a:stretch/>
-        </p:blipFill>
-        <p:spPr>
-          <a:xfrm>
-            <a:off x="6784587" y="5800576"/>
-            <a:ext cx="4286848" cy="228632"/>
-          </a:xfrm>
-          <a:prstGeom prst="rect">
-            <a:avLst/>
-          </a:prstGeom>
-        </p:spPr>
-      </p:pic>
-      <p:sp>
-        <p:nvSpPr>
-          <p:cNvPr id="21" name="TextBox 20">
-            <a:extLst>
-              <a:ext uri="{FF2B5EF4-FFF2-40B4-BE49-F238E27FC236}">
-                <a16:creationId xmlns:a16="http://schemas.microsoft.com/office/drawing/2014/main" id="{8D941CD9-FF40-6F9D-7EC2-116B397C2775}"/>
-              </a:ext>
-            </a:extLst>
-          </p:cNvPr>
-          <p:cNvSpPr txBox="1"/>
-          <p:nvPr/>
-        </p:nvSpPr>
-        <p:spPr>
-          <a:xfrm>
-            <a:off x="78901" y="4996408"/>
-            <a:ext cx="914399" cy="307777"/>
-          </a:xfrm>
-          <a:prstGeom prst="rect">
-            <a:avLst/>
-          </a:prstGeom>
-          <a:noFill/>
-        </p:spPr>
-        <p:txBody>
-          <a:bodyPr wrap="square" rtlCol="0">
-            <a:spAutoFit/>
-          </a:bodyPr>
-          <a:lstStyle/>
-          <a:p>
-            <a:r>
-              <a:rPr lang="en-US" sz="1400" dirty="0"/>
-              <a:t>Quantity</a:t>
-            </a:r>
-          </a:p>
-        </p:txBody>
-      </p:sp>
-      <p:sp>
-        <p:nvSpPr>
-          <p:cNvPr id="22" name="TextBox 21">
-            <a:extLst>
-              <a:ext uri="{FF2B5EF4-FFF2-40B4-BE49-F238E27FC236}">
-                <a16:creationId xmlns:a16="http://schemas.microsoft.com/office/drawing/2014/main" id="{0A789175-8E96-301E-81CA-7E90F48F5517}"/>
-              </a:ext>
-            </a:extLst>
-          </p:cNvPr>
-          <p:cNvSpPr txBox="1"/>
-          <p:nvPr/>
-        </p:nvSpPr>
-        <p:spPr>
-          <a:xfrm>
-            <a:off x="166645" y="5721431"/>
-            <a:ext cx="738909" cy="307777"/>
-          </a:xfrm>
-          <a:prstGeom prst="rect">
-            <a:avLst/>
-          </a:prstGeom>
-          <a:noFill/>
-        </p:spPr>
-        <p:txBody>
-          <a:bodyPr wrap="square" rtlCol="0">
-            <a:spAutoFit/>
-          </a:bodyPr>
-          <a:lstStyle/>
-          <a:p>
-            <a:r>
-              <a:rPr lang="en-US" sz="1400" dirty="0"/>
-              <a:t>Price</a:t>
-            </a:r>
-          </a:p>
-        </p:txBody>
-      </p:sp>
     </p:spTree>
     <p:extLst>
       <p:ext uri="{BB962C8B-B14F-4D97-AF65-F5344CB8AC3E}">
-        <p14:creationId xmlns:p14="http://schemas.microsoft.com/office/powerpoint/2010/main" val="467652972"/>
+        <p14:creationId xmlns:p14="http://schemas.microsoft.com/office/powerpoint/2010/main" val="822355705"/>
       </p:ext>
     </p:extLst>
   </p:cSld>
   <p:clrMapOvr>
     <a:masterClrMapping/>
   </p:clrMapOvr>
-  <mc:AlternateContent xmlns:mc="http://schemas.openxmlformats.org/markup-compatibility/2006" xmlns:p15="http://schemas.microsoft.com/office/powerpoint/2012/main">
-    <mc:Choice Requires="p15">
+  <mc:AlternateContent xmlns:mc="http://schemas.openxmlformats.org/markup-compatibility/2006">
+    <mc:Choice xmlns:p15="http://schemas.microsoft.com/office/powerpoint/2012/main" Requires="p15">
       <p:transition xmlns:p14="http://schemas.microsoft.com/office/powerpoint/2010/main" spd="slow" p14:dur="3250">
         <p15:prstTrans prst="origami"/>
       </p:transition>
     </mc:Choice>
-    <mc:Fallback xmlns="">
+    <mc:Fallback>
       <p:transition spd="slow">
         <p:fade/>
       </p:transition>
@@ -5296,6 +5310,608 @@
               <a:rPr lang="en-US" b="1" dirty="0">
                 <a:cs typeface="Arial" panose="020B0604020202020204" pitchFamily="34" charset="0"/>
               </a:rPr>
+              <a:t>Summary </a:t>
+            </a:r>
+          </a:p>
+        </p:txBody>
+      </p:sp>
+      <p:pic>
+        <p:nvPicPr>
+          <p:cNvPr id="2050" name="Picture 2" descr="Introduction to OpenAPI | Webull API">
+            <a:extLst>
+              <a:ext uri="{FF2B5EF4-FFF2-40B4-BE49-F238E27FC236}">
+                <a16:creationId xmlns:a16="http://schemas.microsoft.com/office/drawing/2014/main" id="{5D4D8DD1-C214-0790-8530-0AD19EBDA1EE}"/>
+              </a:ext>
+            </a:extLst>
+          </p:cNvPr>
+          <p:cNvPicPr>
+            <a:picLocks noChangeAspect="1" noChangeArrowheads="1"/>
+          </p:cNvPicPr>
+          <p:nvPr/>
+        </p:nvPicPr>
+        <p:blipFill>
+          <a:blip r:embed="rId3" cstate="print">
+            <a:extLst>
+              <a:ext uri="{28A0092B-C50C-407E-A947-70E740481C1C}">
+                <a14:useLocalDpi xmlns:a14="http://schemas.microsoft.com/office/drawing/2010/main" val="0"/>
+              </a:ext>
+            </a:extLst>
+          </a:blip>
+          <a:srcRect/>
+          <a:stretch>
+            <a:fillRect/>
+          </a:stretch>
+        </p:blipFill>
+        <p:spPr bwMode="auto">
+          <a:xfrm>
+            <a:off x="11037673" y="0"/>
+            <a:ext cx="1044147" cy="1002958"/>
+          </a:xfrm>
+          <a:prstGeom prst="rect">
+            <a:avLst/>
+          </a:prstGeom>
+          <a:noFill/>
+          <a:extLst>
+            <a:ext uri="{909E8E84-426E-40DD-AFC4-6F175D3DCCD1}">
+              <a14:hiddenFill xmlns:a14="http://schemas.microsoft.com/office/drawing/2010/main">
+                <a:solidFill>
+                  <a:srgbClr val="FFFFFF"/>
+                </a:solidFill>
+              </a14:hiddenFill>
+            </a:ext>
+          </a:extLst>
+        </p:spPr>
+      </p:pic>
+      <p:pic>
+        <p:nvPicPr>
+          <p:cNvPr id="5" name="Graphic 4" descr="Badge 1 with solid fill">
+            <a:extLst>
+              <a:ext uri="{FF2B5EF4-FFF2-40B4-BE49-F238E27FC236}">
+                <a16:creationId xmlns:a16="http://schemas.microsoft.com/office/drawing/2014/main" id="{601513C2-3A92-51BB-08E6-9AAFC39B91C7}"/>
+              </a:ext>
+            </a:extLst>
+          </p:cNvPr>
+          <p:cNvPicPr>
+            <a:picLocks noChangeAspect="1"/>
+          </p:cNvPicPr>
+          <p:nvPr/>
+        </p:nvPicPr>
+        <p:blipFill>
+          <a:blip r:embed="rId4">
+            <a:extLst>
+              <a:ext uri="{28A0092B-C50C-407E-A947-70E740481C1C}">
+                <a14:useLocalDpi xmlns:a14="http://schemas.microsoft.com/office/drawing/2010/main" val="0"/>
+              </a:ext>
+              <a:ext uri="{96DAC541-7B7A-43D3-8B79-37D633B846F1}">
+                <asvg:svgBlip xmlns:asvg="http://schemas.microsoft.com/office/drawing/2016/SVG/main" r:embed="rId5"/>
+              </a:ext>
+            </a:extLst>
+          </a:blip>
+          <a:stretch>
+            <a:fillRect/>
+          </a:stretch>
+        </p:blipFill>
+        <p:spPr>
+          <a:xfrm>
+            <a:off x="410969" y="1450905"/>
+            <a:ext cx="914400" cy="914400"/>
+          </a:xfrm>
+          <a:prstGeom prst="rect">
+            <a:avLst/>
+          </a:prstGeom>
+        </p:spPr>
+      </p:pic>
+      <p:sp>
+        <p:nvSpPr>
+          <p:cNvPr id="6" name="TextBox 5">
+            <a:extLst>
+              <a:ext uri="{FF2B5EF4-FFF2-40B4-BE49-F238E27FC236}">
+                <a16:creationId xmlns:a16="http://schemas.microsoft.com/office/drawing/2014/main" id="{52602A6F-75C7-66B4-5D66-DFE71028C695}"/>
+              </a:ext>
+            </a:extLst>
+          </p:cNvPr>
+          <p:cNvSpPr txBox="1"/>
+          <p:nvPr/>
+        </p:nvSpPr>
+        <p:spPr>
+          <a:xfrm>
+            <a:off x="1494031" y="1488142"/>
+            <a:ext cx="10287000" cy="1138773"/>
+          </a:xfrm>
+          <a:prstGeom prst="rect">
+            <a:avLst/>
+          </a:prstGeom>
+          <a:noFill/>
+        </p:spPr>
+        <p:txBody>
+          <a:bodyPr wrap="square" lIns="91440" tIns="45720" rIns="91440" bIns="45720" rtlCol="0" anchor="t">
+            <a:spAutoFit/>
+          </a:bodyPr>
+          <a:lstStyle/>
+          <a:p>
+            <a:r>
+              <a:rPr lang="en-US" sz="3200" b="0" i="0" dirty="0">
+                <a:solidFill>
+                  <a:srgbClr val="000000"/>
+                </a:solidFill>
+                <a:effectLst/>
+              </a:rPr>
+              <a:t>Total Matching = ~ 97% for </a:t>
+            </a:r>
+            <a:r>
+              <a:rPr lang="en-US" sz="3200" b="0" i="0" dirty="0" err="1">
+                <a:solidFill>
+                  <a:srgbClr val="000000"/>
+                </a:solidFill>
+                <a:effectLst/>
+              </a:rPr>
+              <a:t>Webull</a:t>
+            </a:r>
+            <a:r>
+              <a:rPr lang="en-US" sz="3200" b="0" i="0" dirty="0">
+                <a:solidFill>
+                  <a:srgbClr val="000000"/>
+                </a:solidFill>
+                <a:effectLst/>
+              </a:rPr>
+              <a:t> files, ~80% for TRF files</a:t>
+            </a:r>
+            <a:endParaRPr lang="en-US" sz="3200" dirty="0"/>
+          </a:p>
+          <a:p>
+            <a:endParaRPr lang="en-US" sz="3600" dirty="0"/>
+          </a:p>
+        </p:txBody>
+      </p:sp>
+      <p:pic>
+        <p:nvPicPr>
+          <p:cNvPr id="7" name="Graphic 6" descr="Badge with solid fill">
+            <a:extLst>
+              <a:ext uri="{FF2B5EF4-FFF2-40B4-BE49-F238E27FC236}">
+                <a16:creationId xmlns:a16="http://schemas.microsoft.com/office/drawing/2014/main" id="{0F54D45B-9F7C-0AE9-F410-6B51FFD152E6}"/>
+              </a:ext>
+            </a:extLst>
+          </p:cNvPr>
+          <p:cNvPicPr>
+            <a:picLocks noChangeAspect="1"/>
+          </p:cNvPicPr>
+          <p:nvPr/>
+        </p:nvPicPr>
+        <p:blipFill>
+          <a:blip r:embed="rId6">
+            <a:extLst>
+              <a:ext uri="{96DAC541-7B7A-43D3-8B79-37D633B846F1}">
+                <asvg:svgBlip xmlns:asvg="http://schemas.microsoft.com/office/drawing/2016/SVG/main" r:embed="rId7"/>
+              </a:ext>
+            </a:extLst>
+          </a:blip>
+          <a:stretch>
+            <a:fillRect/>
+          </a:stretch>
+        </p:blipFill>
+        <p:spPr>
+          <a:xfrm>
+            <a:off x="410969" y="3084689"/>
+            <a:ext cx="914400" cy="914400"/>
+          </a:xfrm>
+          <a:prstGeom prst="rect">
+            <a:avLst/>
+          </a:prstGeom>
+        </p:spPr>
+      </p:pic>
+      <p:sp>
+        <p:nvSpPr>
+          <p:cNvPr id="8" name="TextBox 7">
+            <a:extLst>
+              <a:ext uri="{FF2B5EF4-FFF2-40B4-BE49-F238E27FC236}">
+                <a16:creationId xmlns:a16="http://schemas.microsoft.com/office/drawing/2014/main" id="{0AC5DFBB-8526-248D-B4EB-BEC2021AA40A}"/>
+              </a:ext>
+            </a:extLst>
+          </p:cNvPr>
+          <p:cNvSpPr txBox="1"/>
+          <p:nvPr/>
+        </p:nvSpPr>
+        <p:spPr>
+          <a:xfrm>
+            <a:off x="1494031" y="3188846"/>
+            <a:ext cx="10287000" cy="1631216"/>
+          </a:xfrm>
+          <a:prstGeom prst="rect">
+            <a:avLst/>
+          </a:prstGeom>
+          <a:noFill/>
+        </p:spPr>
+        <p:txBody>
+          <a:bodyPr wrap="square" lIns="91440" tIns="45720" rIns="91440" bIns="45720" rtlCol="0" anchor="t">
+            <a:spAutoFit/>
+          </a:bodyPr>
+          <a:lstStyle/>
+          <a:p>
+            <a:r>
+              <a:rPr lang="en-US" sz="3200" dirty="0"/>
+              <a:t>Issues: mismatching price, mismatching quantity, runtime of round 5 is a bit long </a:t>
+            </a:r>
+          </a:p>
+          <a:p>
+            <a:endParaRPr lang="en-US" sz="3600" dirty="0"/>
+          </a:p>
+        </p:txBody>
+      </p:sp>
+      <p:sp>
+        <p:nvSpPr>
+          <p:cNvPr id="3" name="TextBox 2">
+            <a:extLst>
+              <a:ext uri="{FF2B5EF4-FFF2-40B4-BE49-F238E27FC236}">
+                <a16:creationId xmlns:a16="http://schemas.microsoft.com/office/drawing/2014/main" id="{44AC52A0-3BF9-A9A3-DC6F-4935533AC599}"/>
+              </a:ext>
+            </a:extLst>
+          </p:cNvPr>
+          <p:cNvSpPr txBox="1"/>
+          <p:nvPr/>
+        </p:nvSpPr>
+        <p:spPr>
+          <a:xfrm>
+            <a:off x="2965307" y="4512285"/>
+            <a:ext cx="738909" cy="307777"/>
+          </a:xfrm>
+          <a:prstGeom prst="rect">
+            <a:avLst/>
+          </a:prstGeom>
+          <a:noFill/>
+        </p:spPr>
+        <p:txBody>
+          <a:bodyPr wrap="square" rtlCol="0">
+            <a:spAutoFit/>
+          </a:bodyPr>
+          <a:lstStyle/>
+          <a:p>
+            <a:r>
+              <a:rPr lang="en-US" sz="1400" dirty="0"/>
+              <a:t>TRF</a:t>
+            </a:r>
+          </a:p>
+        </p:txBody>
+      </p:sp>
+      <p:sp>
+        <p:nvSpPr>
+          <p:cNvPr id="4" name="TextBox 3">
+            <a:extLst>
+              <a:ext uri="{FF2B5EF4-FFF2-40B4-BE49-F238E27FC236}">
+                <a16:creationId xmlns:a16="http://schemas.microsoft.com/office/drawing/2014/main" id="{89FEC1A5-AB29-239B-DB62-97DFADDD90AE}"/>
+              </a:ext>
+            </a:extLst>
+          </p:cNvPr>
+          <p:cNvSpPr txBox="1"/>
+          <p:nvPr/>
+        </p:nvSpPr>
+        <p:spPr>
+          <a:xfrm>
+            <a:off x="8558556" y="4512285"/>
+            <a:ext cx="738909" cy="307777"/>
+          </a:xfrm>
+          <a:prstGeom prst="rect">
+            <a:avLst/>
+          </a:prstGeom>
+          <a:noFill/>
+        </p:spPr>
+        <p:txBody>
+          <a:bodyPr wrap="square" rtlCol="0">
+            <a:spAutoFit/>
+          </a:bodyPr>
+          <a:lstStyle/>
+          <a:p>
+            <a:r>
+              <a:rPr lang="en-US" sz="1400" dirty="0"/>
+              <a:t>WB</a:t>
+            </a:r>
+          </a:p>
+        </p:txBody>
+      </p:sp>
+      <p:pic>
+        <p:nvPicPr>
+          <p:cNvPr id="10" name="Picture 9">
+            <a:extLst>
+              <a:ext uri="{FF2B5EF4-FFF2-40B4-BE49-F238E27FC236}">
+                <a16:creationId xmlns:a16="http://schemas.microsoft.com/office/drawing/2014/main" id="{1E72E8A1-7817-BFAE-0A9F-FFEA1F987E1E}"/>
+              </a:ext>
+            </a:extLst>
+          </p:cNvPr>
+          <p:cNvPicPr>
+            <a:picLocks noChangeAspect="1"/>
+          </p:cNvPicPr>
+          <p:nvPr/>
+        </p:nvPicPr>
+        <p:blipFill>
+          <a:blip r:embed="rId8">
+            <a:extLst>
+              <a:ext uri="{28A0092B-C50C-407E-A947-70E740481C1C}">
+                <a14:useLocalDpi xmlns:a14="http://schemas.microsoft.com/office/drawing/2010/main" val="0"/>
+              </a:ext>
+            </a:extLst>
+          </a:blip>
+          <a:stretch>
+            <a:fillRect/>
+          </a:stretch>
+        </p:blipFill>
+        <p:spPr>
+          <a:xfrm>
+            <a:off x="1241660" y="4967829"/>
+            <a:ext cx="4925112" cy="438211"/>
+          </a:xfrm>
+          <a:prstGeom prst="rect">
+            <a:avLst/>
+          </a:prstGeom>
+        </p:spPr>
+      </p:pic>
+      <p:pic>
+        <p:nvPicPr>
+          <p:cNvPr id="13" name="Picture 12">
+            <a:extLst>
+              <a:ext uri="{FF2B5EF4-FFF2-40B4-BE49-F238E27FC236}">
+                <a16:creationId xmlns:a16="http://schemas.microsoft.com/office/drawing/2014/main" id="{7CFC2FCB-BE84-A0CC-0067-D1E2A7BC5AFE}"/>
+              </a:ext>
+            </a:extLst>
+          </p:cNvPr>
+          <p:cNvPicPr>
+            <a:picLocks noChangeAspect="1"/>
+          </p:cNvPicPr>
+          <p:nvPr/>
+        </p:nvPicPr>
+        <p:blipFill>
+          <a:blip r:embed="rId9">
+            <a:extLst>
+              <a:ext uri="{28A0092B-C50C-407E-A947-70E740481C1C}">
+                <a14:useLocalDpi xmlns:a14="http://schemas.microsoft.com/office/drawing/2010/main" val="0"/>
+              </a:ext>
+            </a:extLst>
+          </a:blip>
+          <a:stretch>
+            <a:fillRect/>
+          </a:stretch>
+        </p:blipFill>
+        <p:spPr>
+          <a:xfrm>
+            <a:off x="6784586" y="4996408"/>
+            <a:ext cx="4286848" cy="409632"/>
+          </a:xfrm>
+          <a:prstGeom prst="rect">
+            <a:avLst/>
+          </a:prstGeom>
+        </p:spPr>
+      </p:pic>
+      <p:pic>
+        <p:nvPicPr>
+          <p:cNvPr id="18" name="Picture 17">
+            <a:extLst>
+              <a:ext uri="{FF2B5EF4-FFF2-40B4-BE49-F238E27FC236}">
+                <a16:creationId xmlns:a16="http://schemas.microsoft.com/office/drawing/2014/main" id="{625DF1C7-31C2-BFF0-643C-CD111E12C757}"/>
+              </a:ext>
+            </a:extLst>
+          </p:cNvPr>
+          <p:cNvPicPr>
+            <a:picLocks noChangeAspect="1"/>
+          </p:cNvPicPr>
+          <p:nvPr/>
+        </p:nvPicPr>
+        <p:blipFill>
+          <a:blip r:embed="rId10">
+            <a:extLst>
+              <a:ext uri="{28A0092B-C50C-407E-A947-70E740481C1C}">
+                <a14:useLocalDpi xmlns:a14="http://schemas.microsoft.com/office/drawing/2010/main" val="0"/>
+              </a:ext>
+            </a:extLst>
+          </a:blip>
+          <a:stretch>
+            <a:fillRect/>
+          </a:stretch>
+        </p:blipFill>
+        <p:spPr>
+          <a:xfrm>
+            <a:off x="1232133" y="5800576"/>
+            <a:ext cx="4934639" cy="228632"/>
+          </a:xfrm>
+          <a:prstGeom prst="rect">
+            <a:avLst/>
+          </a:prstGeom>
+        </p:spPr>
+      </p:pic>
+      <p:pic>
+        <p:nvPicPr>
+          <p:cNvPr id="20" name="Picture 19">
+            <a:extLst>
+              <a:ext uri="{FF2B5EF4-FFF2-40B4-BE49-F238E27FC236}">
+                <a16:creationId xmlns:a16="http://schemas.microsoft.com/office/drawing/2014/main" id="{BDF0F840-3238-ED09-8D2B-F0105DFE85EA}"/>
+              </a:ext>
+            </a:extLst>
+          </p:cNvPr>
+          <p:cNvPicPr>
+            <a:picLocks noChangeAspect="1"/>
+          </p:cNvPicPr>
+          <p:nvPr/>
+        </p:nvPicPr>
+        <p:blipFill rotWithShape="1">
+          <a:blip r:embed="rId11">
+            <a:extLst>
+              <a:ext uri="{28A0092B-C50C-407E-A947-70E740481C1C}">
+                <a14:useLocalDpi xmlns:a14="http://schemas.microsoft.com/office/drawing/2010/main" val="0"/>
+              </a:ext>
+            </a:extLst>
+          </a:blip>
+          <a:srcRect r="13294"/>
+          <a:stretch/>
+        </p:blipFill>
+        <p:spPr>
+          <a:xfrm>
+            <a:off x="6784587" y="5800576"/>
+            <a:ext cx="4286848" cy="228632"/>
+          </a:xfrm>
+          <a:prstGeom prst="rect">
+            <a:avLst/>
+          </a:prstGeom>
+        </p:spPr>
+      </p:pic>
+      <p:sp>
+        <p:nvSpPr>
+          <p:cNvPr id="21" name="TextBox 20">
+            <a:extLst>
+              <a:ext uri="{FF2B5EF4-FFF2-40B4-BE49-F238E27FC236}">
+                <a16:creationId xmlns:a16="http://schemas.microsoft.com/office/drawing/2014/main" id="{8D941CD9-FF40-6F9D-7EC2-116B397C2775}"/>
+              </a:ext>
+            </a:extLst>
+          </p:cNvPr>
+          <p:cNvSpPr txBox="1"/>
+          <p:nvPr/>
+        </p:nvSpPr>
+        <p:spPr>
+          <a:xfrm>
+            <a:off x="78901" y="4996408"/>
+            <a:ext cx="914399" cy="307777"/>
+          </a:xfrm>
+          <a:prstGeom prst="rect">
+            <a:avLst/>
+          </a:prstGeom>
+          <a:noFill/>
+        </p:spPr>
+        <p:txBody>
+          <a:bodyPr wrap="square" rtlCol="0">
+            <a:spAutoFit/>
+          </a:bodyPr>
+          <a:lstStyle/>
+          <a:p>
+            <a:r>
+              <a:rPr lang="en-US" sz="1400" dirty="0"/>
+              <a:t>Quantity</a:t>
+            </a:r>
+          </a:p>
+        </p:txBody>
+      </p:sp>
+      <p:sp>
+        <p:nvSpPr>
+          <p:cNvPr id="22" name="TextBox 21">
+            <a:extLst>
+              <a:ext uri="{FF2B5EF4-FFF2-40B4-BE49-F238E27FC236}">
+                <a16:creationId xmlns:a16="http://schemas.microsoft.com/office/drawing/2014/main" id="{0A789175-8E96-301E-81CA-7E90F48F5517}"/>
+              </a:ext>
+            </a:extLst>
+          </p:cNvPr>
+          <p:cNvSpPr txBox="1"/>
+          <p:nvPr/>
+        </p:nvSpPr>
+        <p:spPr>
+          <a:xfrm>
+            <a:off x="166645" y="5721431"/>
+            <a:ext cx="738909" cy="307777"/>
+          </a:xfrm>
+          <a:prstGeom prst="rect">
+            <a:avLst/>
+          </a:prstGeom>
+          <a:noFill/>
+        </p:spPr>
+        <p:txBody>
+          <a:bodyPr wrap="square" rtlCol="0">
+            <a:spAutoFit/>
+          </a:bodyPr>
+          <a:lstStyle/>
+          <a:p>
+            <a:r>
+              <a:rPr lang="en-US" sz="1400" dirty="0"/>
+              <a:t>Price</a:t>
+            </a:r>
+          </a:p>
+        </p:txBody>
+      </p:sp>
+    </p:spTree>
+    <p:extLst>
+      <p:ext uri="{BB962C8B-B14F-4D97-AF65-F5344CB8AC3E}">
+        <p14:creationId xmlns:p14="http://schemas.microsoft.com/office/powerpoint/2010/main" val="467652972"/>
+      </p:ext>
+    </p:extLst>
+  </p:cSld>
+  <p:clrMapOvr>
+    <a:masterClrMapping/>
+  </p:clrMapOvr>
+  <mc:AlternateContent xmlns:mc="http://schemas.openxmlformats.org/markup-compatibility/2006" xmlns:p15="http://schemas.microsoft.com/office/powerpoint/2012/main">
+    <mc:Choice Requires="p15">
+      <p:transition xmlns:p14="http://schemas.microsoft.com/office/powerpoint/2010/main" spd="slow" p14:dur="3250">
+        <p15:prstTrans prst="origami"/>
+      </p:transition>
+    </mc:Choice>
+    <mc:Fallback xmlns="">
+      <p:transition spd="slow">
+        <p:fade/>
+      </p:transition>
+    </mc:Fallback>
+  </mc:AlternateContent>
+</p:sld>
+</file>
+
+<file path=ppt/slides/slide12.xml><?xml version="1.0" encoding="utf-8"?>
+<p:sld xmlns:a="http://schemas.openxmlformats.org/drawingml/2006/main" xmlns:r="http://schemas.openxmlformats.org/officeDocument/2006/relationships" xmlns:p="http://schemas.openxmlformats.org/presentationml/2006/main">
+  <p:cSld>
+    <p:bg>
+      <p:bgPr>
+        <a:gradFill flip="none" rotWithShape="1">
+          <a:gsLst>
+            <a:gs pos="15000">
+              <a:schemeClr val="bg1"/>
+            </a:gs>
+            <a:gs pos="0">
+              <a:srgbClr val="0043E9">
+                <a:lumMod val="19000"/>
+                <a:lumOff val="81000"/>
+              </a:srgbClr>
+            </a:gs>
+          </a:gsLst>
+          <a:lin ang="5400000" scaled="1"/>
+          <a:tileRect/>
+        </a:gradFill>
+        <a:effectLst/>
+      </p:bgPr>
+    </p:bg>
+    <p:spTree>
+      <p:nvGrpSpPr>
+        <p:cNvPr id="1" name=""/>
+        <p:cNvGrpSpPr/>
+        <p:nvPr/>
+      </p:nvGrpSpPr>
+      <p:grpSpPr>
+        <a:xfrm>
+          <a:off x="0" y="0"/>
+          <a:ext cx="0" cy="0"/>
+          <a:chOff x="0" y="0"/>
+          <a:chExt cx="0" cy="0"/>
+        </a:xfrm>
+      </p:grpSpPr>
+      <p:sp>
+        <p:nvSpPr>
+          <p:cNvPr id="2" name="Title 1">
+            <a:extLst>
+              <a:ext uri="{FF2B5EF4-FFF2-40B4-BE49-F238E27FC236}">
+                <a16:creationId xmlns:a16="http://schemas.microsoft.com/office/drawing/2014/main" id="{DD079097-250B-1755-9E96-EA28080BDEAF}"/>
+              </a:ext>
+            </a:extLst>
+          </p:cNvPr>
+          <p:cNvSpPr>
+            <a:spLocks noGrp="1"/>
+          </p:cNvSpPr>
+          <p:nvPr>
+            <p:ph type="title"/>
+          </p:nvPr>
+        </p:nvSpPr>
+        <p:spPr>
+          <a:xfrm>
+            <a:off x="670353" y="179558"/>
+            <a:ext cx="10515600" cy="1002958"/>
+          </a:xfrm>
+        </p:spPr>
+        <p:txBody>
+          <a:bodyPr/>
+          <a:lstStyle/>
+          <a:p>
+            <a:r>
+              <a:rPr lang="en-US" b="1" dirty="0">
+                <a:cs typeface="Arial" panose="020B0604020202020204" pitchFamily="34" charset="0"/>
+              </a:rPr>
               <a:t>Potential Solutions </a:t>
             </a:r>
           </a:p>
@@ -5672,7 +6288,7 @@
 </p:sld>
 </file>
 
-<file path=ppt/slides/slide12.xml><?xml version="1.0" encoding="utf-8"?>
+<file path=ppt/slides/slide13.xml><?xml version="1.0" encoding="utf-8"?>
 <p:sld xmlns:a="http://schemas.openxmlformats.org/drawingml/2006/main" xmlns:r="http://schemas.openxmlformats.org/officeDocument/2006/relationships" xmlns:p="http://schemas.openxmlformats.org/presentationml/2006/main">
   <p:cSld>
     <p:spTree>
@@ -10411,7 +11027,7 @@
           <a:p>
             <a:r>
               <a:rPr lang="en-US" sz="3200" dirty="0"/>
-              <a:t>Fourth round match percentage = 1%</a:t>
+              <a:t>Fourth round match percentage = 1% for both </a:t>
             </a:r>
           </a:p>
           <a:p>
@@ -11419,20 +12035,20 @@
 </file>
 
 <file path=customXml/item2.xml><?xml version="1.0" encoding="utf-8"?>
+<p:properties xmlns:p="http://schemas.microsoft.com/office/2006/metadata/properties" xmlns:xsi="http://www.w3.org/2001/XMLSchema-instance" xmlns:pc="http://schemas.microsoft.com/office/infopath/2007/PartnerControls">
+  <documentManagement>
+    <_activity xmlns="04634fbf-cba0-4f2c-b64b-bfe5786ed74a" xsi:nil="true"/>
+  </documentManagement>
+</p:properties>
+</file>
+
+<file path=customXml/item3.xml><?xml version="1.0" encoding="utf-8"?>
 <?mso-contentType ?>
 <FormTemplates xmlns="http://schemas.microsoft.com/sharepoint/v3/contenttype/forms">
   <Display>DocumentLibraryForm</Display>
   <Edit>DocumentLibraryForm</Edit>
   <New>DocumentLibraryForm</New>
 </FormTemplates>
-</file>
-
-<file path=customXml/item3.xml><?xml version="1.0" encoding="utf-8"?>
-<p:properties xmlns:p="http://schemas.microsoft.com/office/2006/metadata/properties" xmlns:xsi="http://www.w3.org/2001/XMLSchema-instance" xmlns:pc="http://schemas.microsoft.com/office/infopath/2007/PartnerControls">
-  <documentManagement>
-    <_activity xmlns="04634fbf-cba0-4f2c-b64b-bfe5786ed74a" xsi:nil="true"/>
-  </documentManagement>
-</p:properties>
 </file>
 
 <file path=customXml/itemProps1.xml><?xml version="1.0" encoding="utf-8"?>
@@ -11454,14 +12070,6 @@
 </file>
 
 <file path=customXml/itemProps2.xml><?xml version="1.0" encoding="utf-8"?>
-<ds:datastoreItem xmlns:ds="http://schemas.openxmlformats.org/officeDocument/2006/customXml" ds:itemID="{C87C4A66-61EC-4D03-9A42-DCBF8752D11E}">
-  <ds:schemaRefs>
-    <ds:schemaRef ds:uri="http://schemas.microsoft.com/sharepoint/v3/contenttype/forms"/>
-  </ds:schemaRefs>
-</ds:datastoreItem>
-</file>
-
-<file path=customXml/itemProps3.xml><?xml version="1.0" encoding="utf-8"?>
 <ds:datastoreItem xmlns:ds="http://schemas.openxmlformats.org/officeDocument/2006/customXml" ds:itemID="{943027CA-153C-43A2-9067-346C0FB0C7E1}">
   <ds:schemaRefs>
     <ds:schemaRef ds:uri="http://purl.org/dc/elements/1.1/"/>
@@ -11475,4 +12083,12 @@
     <ds:schemaRef ds:uri="http://schemas.microsoft.com/office/2006/metadata/properties"/>
   </ds:schemaRefs>
 </ds:datastoreItem>
+</file>
+
+<file path=customXml/itemProps3.xml><?xml version="1.0" encoding="utf-8"?>
+<ds:datastoreItem xmlns:ds="http://schemas.openxmlformats.org/officeDocument/2006/customXml" ds:itemID="{C87C4A66-61EC-4D03-9A42-DCBF8752D11E}">
+  <ds:schemaRefs>
+    <ds:schemaRef ds:uri="http://schemas.microsoft.com/sharepoint/v3/contenttype/forms"/>
+  </ds:schemaRefs>
+</ds:datastoreItem>
 </file>
</xml_diff>

<commit_message>
Added some statistics and renamed variables
</commit_message>
<xml_diff>
--- a/Presentation_Matching_2.pptx
+++ b/Presentation_Matching_2.pptx
@@ -4906,7 +4906,7 @@
                 </a:solidFill>
                 <a:effectLst/>
               </a:rPr>
-              <a:t>Use DP to calculate if it’s possible to sum up to cumulative value, then append possible combination to matching list</a:t>
+              <a:t>Use DP to calculate if it’s possible to sum up to cumulative value, then append random combination to matching list</a:t>
             </a:r>
             <a:endParaRPr lang="en-US" sz="3200" dirty="0"/>
           </a:p>
@@ -5228,13 +5228,13 @@
   <p:clrMapOvr>
     <a:masterClrMapping/>
   </p:clrMapOvr>
-  <mc:AlternateContent xmlns:mc="http://schemas.openxmlformats.org/markup-compatibility/2006">
-    <mc:Choice xmlns:p15="http://schemas.microsoft.com/office/powerpoint/2012/main" Requires="p15">
+  <mc:AlternateContent xmlns:mc="http://schemas.openxmlformats.org/markup-compatibility/2006" xmlns:p15="http://schemas.microsoft.com/office/powerpoint/2012/main">
+    <mc:Choice Requires="p15">
       <p:transition xmlns:p14="http://schemas.microsoft.com/office/powerpoint/2010/main" spd="slow" p14:dur="3250">
         <p15:prstTrans prst="origami"/>
       </p:transition>
     </mc:Choice>
-    <mc:Fallback>
+    <mc:Fallback xmlns="">
       <p:transition spd="slow">
         <p:fade/>
       </p:transition>
@@ -5513,8 +5513,8 @@
         </p:nvSpPr>
         <p:spPr>
           <a:xfrm>
-            <a:off x="1494031" y="3188846"/>
-            <a:ext cx="10287000" cy="1631216"/>
+            <a:off x="1494031" y="2987398"/>
+            <a:ext cx="10287000" cy="2123658"/>
           </a:xfrm>
           <a:prstGeom prst="rect">
             <a:avLst/>
@@ -5529,7 +5529,7 @@
           <a:p>
             <a:r>
               <a:rPr lang="en-US" sz="3200" dirty="0"/>
-              <a:t>Issues: mismatching price, mismatching quantity, runtime of round 5 is a bit long </a:t>
+              <a:t>Issues: mismatching price, mismatching quantity, runtime of round 5 is a bit long  and randomly matches orders</a:t>
             </a:r>
           </a:p>
           <a:p>
@@ -11853,6 +11853,14 @@
 </file>
 
 <file path=customXml/item1.xml><?xml version="1.0" encoding="utf-8"?>
+<p:properties xmlns:p="http://schemas.microsoft.com/office/2006/metadata/properties" xmlns:xsi="http://www.w3.org/2001/XMLSchema-instance" xmlns:pc="http://schemas.microsoft.com/office/infopath/2007/PartnerControls">
+  <documentManagement>
+    <_activity xmlns="04634fbf-cba0-4f2c-b64b-bfe5786ed74a" xsi:nil="true"/>
+  </documentManagement>
+</p:properties>
+</file>
+
+<file path=customXml/item2.xml><?xml version="1.0" encoding="utf-8"?>
 <ct:contentTypeSchema xmlns:ct="http://schemas.microsoft.com/office/2006/metadata/contentType" xmlns:ma="http://schemas.microsoft.com/office/2006/metadata/properties/metaAttributes" ct:_="" ma:_="" ma:contentTypeName="文档" ma:contentTypeID="0x01010091704C4F4458AD4799CA30A1424640A8" ma:contentTypeVersion="10" ma:contentTypeDescription="新建文档。" ma:contentTypeScope="" ma:versionID="603888007cbb681a3473a2397bc01e52">
   <xsd:schema xmlns:xsd="http://www.w3.org/2001/XMLSchema" xmlns:xs="http://www.w3.org/2001/XMLSchema" xmlns:p="http://schemas.microsoft.com/office/2006/metadata/properties" xmlns:ns3="04634fbf-cba0-4f2c-b64b-bfe5786ed74a" targetNamespace="http://schemas.microsoft.com/office/2006/metadata/properties" ma:root="true" ma:fieldsID="3e2da1342de8abc2c9ddcd8cd30c6802" ns3:_="">
     <xsd:import namespace="04634fbf-cba0-4f2c-b64b-bfe5786ed74a"/>
@@ -12034,14 +12042,6 @@
 </ct:contentTypeSchema>
 </file>
 
-<file path=customXml/item2.xml><?xml version="1.0" encoding="utf-8"?>
-<p:properties xmlns:p="http://schemas.microsoft.com/office/2006/metadata/properties" xmlns:xsi="http://www.w3.org/2001/XMLSchema-instance" xmlns:pc="http://schemas.microsoft.com/office/infopath/2007/PartnerControls">
-  <documentManagement>
-    <_activity xmlns="04634fbf-cba0-4f2c-b64b-bfe5786ed74a" xsi:nil="true"/>
-  </documentManagement>
-</p:properties>
-</file>
-
 <file path=customXml/item3.xml><?xml version="1.0" encoding="utf-8"?>
 <?mso-contentType ?>
 <FormTemplates xmlns="http://schemas.microsoft.com/sharepoint/v3/contenttype/forms">
@@ -12052,6 +12052,22 @@
 </file>
 
 <file path=customXml/itemProps1.xml><?xml version="1.0" encoding="utf-8"?>
+<ds:datastoreItem xmlns:ds="http://schemas.openxmlformats.org/officeDocument/2006/customXml" ds:itemID="{943027CA-153C-43A2-9067-346C0FB0C7E1}">
+  <ds:schemaRefs>
+    <ds:schemaRef ds:uri="http://purl.org/dc/elements/1.1/"/>
+    <ds:schemaRef ds:uri="http://www.w3.org/XML/1998/namespace"/>
+    <ds:schemaRef ds:uri="http://purl.org/dc/dcmitype/"/>
+    <ds:schemaRef ds:uri="http://purl.org/dc/terms/"/>
+    <ds:schemaRef ds:uri="http://schemas.openxmlformats.org/package/2006/metadata/core-properties"/>
+    <ds:schemaRef ds:uri="http://schemas.microsoft.com/office/2006/documentManagement/types"/>
+    <ds:schemaRef ds:uri="http://schemas.microsoft.com/office/infopath/2007/PartnerControls"/>
+    <ds:schemaRef ds:uri="04634fbf-cba0-4f2c-b64b-bfe5786ed74a"/>
+    <ds:schemaRef ds:uri="http://schemas.microsoft.com/office/2006/metadata/properties"/>
+  </ds:schemaRefs>
+</ds:datastoreItem>
+</file>
+
+<file path=customXml/itemProps2.xml><?xml version="1.0" encoding="utf-8"?>
 <ds:datastoreItem xmlns:ds="http://schemas.openxmlformats.org/officeDocument/2006/customXml" ds:itemID="{C71712F0-88DD-463B-AD23-6E1917D892F7}">
   <ds:schemaRefs>
     <ds:schemaRef ds:uri="http://schemas.microsoft.com/office/2006/metadata/contentType"/>
@@ -12069,22 +12085,6 @@
 </ds:datastoreItem>
 </file>
 
-<file path=customXml/itemProps2.xml><?xml version="1.0" encoding="utf-8"?>
-<ds:datastoreItem xmlns:ds="http://schemas.openxmlformats.org/officeDocument/2006/customXml" ds:itemID="{943027CA-153C-43A2-9067-346C0FB0C7E1}">
-  <ds:schemaRefs>
-    <ds:schemaRef ds:uri="http://purl.org/dc/elements/1.1/"/>
-    <ds:schemaRef ds:uri="http://www.w3.org/XML/1998/namespace"/>
-    <ds:schemaRef ds:uri="http://purl.org/dc/dcmitype/"/>
-    <ds:schemaRef ds:uri="http://purl.org/dc/terms/"/>
-    <ds:schemaRef ds:uri="http://schemas.openxmlformats.org/package/2006/metadata/core-properties"/>
-    <ds:schemaRef ds:uri="http://schemas.microsoft.com/office/2006/documentManagement/types"/>
-    <ds:schemaRef ds:uri="http://schemas.microsoft.com/office/infopath/2007/PartnerControls"/>
-    <ds:schemaRef ds:uri="04634fbf-cba0-4f2c-b64b-bfe5786ed74a"/>
-    <ds:schemaRef ds:uri="http://schemas.microsoft.com/office/2006/metadata/properties"/>
-  </ds:schemaRefs>
-</ds:datastoreItem>
-</file>
-
 <file path=customXml/itemProps3.xml><?xml version="1.0" encoding="utf-8"?>
 <ds:datastoreItem xmlns:ds="http://schemas.openxmlformats.org/officeDocument/2006/customXml" ds:itemID="{C87C4A66-61EC-4D03-9A42-DCBF8752D11E}">
   <ds:schemaRefs>

</xml_diff>

<commit_message>
Updated information on presentation deck
</commit_message>
<xml_diff>
--- a/Presentation_Matching_2.pptx
+++ b/Presentation_Matching_2.pptx
@@ -4966,7 +4966,7 @@
         <p:spPr>
           <a:xfrm>
             <a:off x="1494031" y="3188846"/>
-            <a:ext cx="10287000" cy="1138773"/>
+            <a:ext cx="10287000" cy="1631216"/>
           </a:xfrm>
           <a:prstGeom prst="rect">
             <a:avLst/>
@@ -4981,21 +4981,8 @@
           <a:p>
             <a:r>
               <a:rPr lang="en-US" sz="3200" dirty="0"/>
-              <a:t>Fourth round match percentage = 50% for </a:t>
-            </a:r>
-            <a:r>
-              <a:rPr lang="en-US" sz="3200" dirty="0" err="1"/>
-              <a:t>wb</a:t>
-            </a:r>
-            <a:r>
-              <a:rPr lang="en-US" sz="3200" dirty="0"/>
-              <a:t>, 25% for </a:t>
-            </a:r>
-            <a:r>
-              <a:rPr lang="en-US" sz="3200" dirty="0" err="1"/>
-              <a:t>trf</a:t>
-            </a:r>
-            <a:endParaRPr lang="en-US" sz="3200" dirty="0"/>
+              <a:t>Fourth round match percentage = 50% for WB, 25% for TRF</a:t>
+            </a:r>
           </a:p>
           <a:p>
             <a:endParaRPr lang="en-US" sz="3600" dirty="0"/>
@@ -9978,7 +9965,7 @@
         <p:spPr>
           <a:xfrm>
             <a:off x="1494031" y="3188846"/>
-            <a:ext cx="10287000" cy="1138773"/>
+            <a:ext cx="10287000" cy="1631216"/>
           </a:xfrm>
           <a:prstGeom prst="rect">
             <a:avLst/>
@@ -9993,7 +9980,7 @@
           <a:p>
             <a:r>
               <a:rPr lang="en-US" sz="3200" dirty="0"/>
-              <a:t>Second round match percentage = 22%</a:t>
+              <a:t>Second round match percentage = 20% for WB, 25% for TRF</a:t>
             </a:r>
           </a:p>
           <a:p>
@@ -10510,7 +10497,7 @@
           <a:p>
             <a:r>
               <a:rPr lang="en-US" sz="3200" dirty="0"/>
-              <a:t>Third round match percentage = 3%</a:t>
+              <a:t>Third round match percentage = 4% for WB, 9% for TRF</a:t>
             </a:r>
           </a:p>
           <a:p>
@@ -11027,7 +11014,7 @@
           <a:p>
             <a:r>
               <a:rPr lang="en-US" sz="3200" dirty="0"/>
-              <a:t>Fourth round match percentage = 1% for both </a:t>
+              <a:t>Fourth round match percentage = 1% for WB, 2% for TRF </a:t>
             </a:r>
           </a:p>
           <a:p>
@@ -11853,11 +11840,12 @@
 </file>
 
 <file path=customXml/item1.xml><?xml version="1.0" encoding="utf-8"?>
-<p:properties xmlns:p="http://schemas.microsoft.com/office/2006/metadata/properties" xmlns:xsi="http://www.w3.org/2001/XMLSchema-instance" xmlns:pc="http://schemas.microsoft.com/office/infopath/2007/PartnerControls">
-  <documentManagement>
-    <_activity xmlns="04634fbf-cba0-4f2c-b64b-bfe5786ed74a" xsi:nil="true"/>
-  </documentManagement>
-</p:properties>
+<?mso-contentType ?>
+<FormTemplates xmlns="http://schemas.microsoft.com/sharepoint/v3/contenttype/forms">
+  <Display>DocumentLibraryForm</Display>
+  <Edit>DocumentLibraryForm</Edit>
+  <New>DocumentLibraryForm</New>
+</FormTemplates>
 </file>
 
 <file path=customXml/item2.xml><?xml version="1.0" encoding="utf-8"?>
@@ -12043,26 +12031,17 @@
 </file>
 
 <file path=customXml/item3.xml><?xml version="1.0" encoding="utf-8"?>
-<?mso-contentType ?>
-<FormTemplates xmlns="http://schemas.microsoft.com/sharepoint/v3/contenttype/forms">
-  <Display>DocumentLibraryForm</Display>
-  <Edit>DocumentLibraryForm</Edit>
-  <New>DocumentLibraryForm</New>
-</FormTemplates>
+<p:properties xmlns:p="http://schemas.microsoft.com/office/2006/metadata/properties" xmlns:xsi="http://www.w3.org/2001/XMLSchema-instance" xmlns:pc="http://schemas.microsoft.com/office/infopath/2007/PartnerControls">
+  <documentManagement>
+    <_activity xmlns="04634fbf-cba0-4f2c-b64b-bfe5786ed74a" xsi:nil="true"/>
+  </documentManagement>
+</p:properties>
 </file>
 
 <file path=customXml/itemProps1.xml><?xml version="1.0" encoding="utf-8"?>
-<ds:datastoreItem xmlns:ds="http://schemas.openxmlformats.org/officeDocument/2006/customXml" ds:itemID="{943027CA-153C-43A2-9067-346C0FB0C7E1}">
+<ds:datastoreItem xmlns:ds="http://schemas.openxmlformats.org/officeDocument/2006/customXml" ds:itemID="{C87C4A66-61EC-4D03-9A42-DCBF8752D11E}">
   <ds:schemaRefs>
-    <ds:schemaRef ds:uri="http://purl.org/dc/elements/1.1/"/>
-    <ds:schemaRef ds:uri="http://www.w3.org/XML/1998/namespace"/>
-    <ds:schemaRef ds:uri="http://purl.org/dc/dcmitype/"/>
-    <ds:schemaRef ds:uri="http://purl.org/dc/terms/"/>
-    <ds:schemaRef ds:uri="http://schemas.openxmlformats.org/package/2006/metadata/core-properties"/>
-    <ds:schemaRef ds:uri="http://schemas.microsoft.com/office/2006/documentManagement/types"/>
-    <ds:schemaRef ds:uri="http://schemas.microsoft.com/office/infopath/2007/PartnerControls"/>
-    <ds:schemaRef ds:uri="04634fbf-cba0-4f2c-b64b-bfe5786ed74a"/>
-    <ds:schemaRef ds:uri="http://schemas.microsoft.com/office/2006/metadata/properties"/>
+    <ds:schemaRef ds:uri="http://schemas.microsoft.com/sharepoint/v3/contenttype/forms"/>
   </ds:schemaRefs>
 </ds:datastoreItem>
 </file>
@@ -12086,9 +12065,17 @@
 </file>
 
 <file path=customXml/itemProps3.xml><?xml version="1.0" encoding="utf-8"?>
-<ds:datastoreItem xmlns:ds="http://schemas.openxmlformats.org/officeDocument/2006/customXml" ds:itemID="{C87C4A66-61EC-4D03-9A42-DCBF8752D11E}">
+<ds:datastoreItem xmlns:ds="http://schemas.openxmlformats.org/officeDocument/2006/customXml" ds:itemID="{943027CA-153C-43A2-9067-346C0FB0C7E1}">
   <ds:schemaRefs>
-    <ds:schemaRef ds:uri="http://schemas.microsoft.com/sharepoint/v3/contenttype/forms"/>
+    <ds:schemaRef ds:uri="http://purl.org/dc/elements/1.1/"/>
+    <ds:schemaRef ds:uri="http://www.w3.org/XML/1998/namespace"/>
+    <ds:schemaRef ds:uri="http://purl.org/dc/dcmitype/"/>
+    <ds:schemaRef ds:uri="http://purl.org/dc/terms/"/>
+    <ds:schemaRef ds:uri="http://schemas.openxmlformats.org/package/2006/metadata/core-properties"/>
+    <ds:schemaRef ds:uri="http://schemas.microsoft.com/office/2006/documentManagement/types"/>
+    <ds:schemaRef ds:uri="http://schemas.microsoft.com/office/infopath/2007/PartnerControls"/>
+    <ds:schemaRef ds:uri="04634fbf-cba0-4f2c-b64b-bfe5786ed74a"/>
+    <ds:schemaRef ds:uri="http://schemas.microsoft.com/office/2006/metadata/properties"/>
   </ds:schemaRefs>
 </ds:datastoreItem>
 </file>
</xml_diff>